<commit_message>
changed to run on synthetic data.
</commit_message>
<xml_diff>
--- a/Workshops/Workshop3.pptx
+++ b/Workshops/Workshop3.pptx
@@ -6671,9 +6671,9 @@
                 <a:latin typeface="Courier"/>
               </a:rPr>
               <a:t>## # A tibble: 1 x 1
-##   sex  
-##   &lt;chr&gt;
-## 1 M</a:t>
+##   temp_nc
+##     &lt;dbl&gt;
+## 1    36.1</a:t>
             </a:r>
           </a:p>
           <a:p>
@@ -7756,8 +7756,8 @@
                 <a:latin typeface="Courier"/>
               </a:rPr>
               <a:t>## 
-##   F   M 
-## 449 562</a:t>
+##    F    M 
+## 2246 2754</a:t>
             </a:r>
           </a:p>
         </p:txBody>
@@ -7896,8 +7896,8 @@
                 <a:latin typeface="Courier"/>
               </a:rPr>
               <a:t>## 
-##   A   D 
-## 908 103</a:t>
+##    A    D 
+## 4444  556</a:t>
             </a:r>
           </a:p>
         </p:txBody>

</xml_diff>